<commit_message>
Finished the final piece of part1
</commit_message>
<xml_diff>
--- a/slides/part1_actions.pptx
+++ b/slides/part1_actions.pptx
@@ -6,20 +6,27 @@
     <p:sldMasterId id="2147483656" r:id="rId2"/>
   </p:sldMasterIdLst>
   <p:notesMasterIdLst>
-    <p:notesMasterId r:id="rId6"/>
+    <p:notesMasterId r:id="rId13"/>
   </p:notesMasterIdLst>
   <p:handoutMasterIdLst>
-    <p:handoutMasterId r:id="rId7"/>
+    <p:handoutMasterId r:id="rId14"/>
   </p:handoutMasterIdLst>
   <p:sldIdLst>
     <p:sldId id="676" r:id="rId3"/>
     <p:sldId id="677" r:id="rId4"/>
     <p:sldId id="678" r:id="rId5"/>
+    <p:sldId id="679" r:id="rId6"/>
+    <p:sldId id="680" r:id="rId7"/>
+    <p:sldId id="681" r:id="rId8"/>
+    <p:sldId id="682" r:id="rId9"/>
+    <p:sldId id="683" r:id="rId10"/>
+    <p:sldId id="684" r:id="rId11"/>
+    <p:sldId id="685" r:id="rId12"/>
   </p:sldIdLst>
   <p:sldSz cx="9144000" cy="6858000" type="screen4x3"/>
   <p:notesSz cx="9601200" cy="7315200"/>
   <p:custDataLst>
-    <p:tags r:id="rId8"/>
+    <p:tags r:id="rId15"/>
   </p:custDataLst>
   <p:defaultTextStyle>
     <a:defPPr>
@@ -244,7 +251,7 @@
               <a:pPr>
                 <a:defRPr/>
               </a:pPr>
-              <a:t>8/25/2010 9:25 PM</a:t>
+              <a:t>8/26/2010 12:51 PM</a:t>
             </a:fld>
             <a:endParaRPr lang="en-US"/>
           </a:p>
@@ -454,7 +461,7 @@
               <a:pPr>
                 <a:defRPr/>
               </a:pPr>
-              <a:t>8/25/2010 9:25 PM</a:t>
+              <a:t>8/26/2010 12:51 PM</a:t>
             </a:fld>
             <a:endParaRPr lang="en-US"/>
           </a:p>
@@ -854,7 +861,7 @@
             <a:fld id="{645EDAD1-88E4-4536-AD95-0BFD82EC77E6}" type="datetime8">
               <a:rPr lang="en-US" smtClean="0"/>
               <a:pPr/>
-              <a:t>8/25/2010 9:25 PM</a:t>
+              <a:t>8/26/2010 12:51 PM</a:t>
             </a:fld>
             <a:endParaRPr lang="en-US" smtClean="0"/>
           </a:p>
@@ -7055,11 +7062,7 @@
             </a:r>
             <a:r>
               <a:rPr lang="en-US" sz="4600" b="1" smtClean="0"/>
-              <a:t>: </a:t>
-            </a:r>
-            <a:r>
-              <a:rPr lang="en-US" sz="4600" b="1" smtClean="0"/>
-              <a:t>Actions</a:t>
+              <a:t>: Actions</a:t>
             </a:r>
             <a:endParaRPr lang="en-US" sz="4600" b="1" dirty="0" smtClean="0">
               <a:solidFill>
@@ -7131,6 +7134,169 @@
       </p:par>
     </p:tnLst>
   </p:timing>
+</p:sld>
+</file>
+
+<file path=ppt/slides/slide10.xml><?xml version="1.0" encoding="utf-8"?>
+<p:sld xmlns:a="http://schemas.openxmlformats.org/drawingml/2006/main" xmlns:r="http://schemas.openxmlformats.org/officeDocument/2006/relationships" xmlns:p="http://schemas.openxmlformats.org/presentationml/2006/main">
+  <p:cSld>
+    <p:spTree>
+      <p:nvGrpSpPr>
+        <p:cNvPr id="1" name=""/>
+        <p:cNvGrpSpPr/>
+        <p:nvPr/>
+      </p:nvGrpSpPr>
+      <p:grpSpPr>
+        <a:xfrm>
+          <a:off x="0" y="0"/>
+          <a:ext cx="0" cy="0"/>
+          <a:chOff x="0" y="0"/>
+          <a:chExt cx="0" cy="0"/>
+        </a:xfrm>
+      </p:grpSpPr>
+      <p:sp>
+        <p:nvSpPr>
+          <p:cNvPr id="2" name="Title 1"/>
+          <p:cNvSpPr>
+            <a:spLocks noGrp="1"/>
+          </p:cNvSpPr>
+          <p:nvPr>
+            <p:ph type="title"/>
+          </p:nvPr>
+        </p:nvSpPr>
+        <p:spPr/>
+        <p:txBody>
+          <a:bodyPr/>
+          <a:lstStyle/>
+          <a:p>
+            <a:r>
+              <a:rPr lang="en-US" b="1" dirty="0" smtClean="0"/>
+              <a:t>Quick Lab</a:t>
+            </a:r>
+            <a:endParaRPr lang="en-US" b="1" dirty="0"/>
+          </a:p>
+        </p:txBody>
+      </p:sp>
+      <p:sp>
+        <p:nvSpPr>
+          <p:cNvPr id="3" name="Content Placeholder 2"/>
+          <p:cNvSpPr>
+            <a:spLocks noGrp="1"/>
+          </p:cNvSpPr>
+          <p:nvPr>
+            <p:ph idx="1"/>
+          </p:nvPr>
+        </p:nvSpPr>
+        <p:spPr>
+          <a:xfrm>
+            <a:off x="381002" y="1417638"/>
+            <a:ext cx="8410575" cy="4830762"/>
+          </a:xfrm>
+        </p:spPr>
+        <p:txBody>
+          <a:bodyPr/>
+          <a:lstStyle/>
+          <a:p>
+            <a:r>
+              <a:rPr lang="en-US" dirty="0" smtClean="0"/>
+              <a:t>On the URL…</a:t>
+            </a:r>
+          </a:p>
+          <a:p>
+            <a:pPr lvl="1"/>
+            <a:r>
+              <a:rPr lang="en-US" dirty="0" smtClean="0"/>
+              <a:t>Accept only numbers (at most 4)</a:t>
+            </a:r>
+          </a:p>
+          <a:p>
+            <a:pPr lvl="2"/>
+            <a:r>
+              <a:rPr lang="en-US" dirty="0" smtClean="0"/>
+              <a:t>Not the last item on the route</a:t>
+            </a:r>
+          </a:p>
+          <a:p>
+            <a:r>
+              <a:rPr lang="en-US" dirty="0" smtClean="0"/>
+              <a:t>If the number is odd,</a:t>
+            </a:r>
+          </a:p>
+          <a:p>
+            <a:pPr lvl="1"/>
+            <a:r>
+              <a:rPr lang="en-US" dirty="0" smtClean="0"/>
+              <a:t>Redirect to Google</a:t>
+            </a:r>
+          </a:p>
+          <a:p>
+            <a:r>
+              <a:rPr lang="en-US" dirty="0" smtClean="0"/>
+              <a:t>If the number is even,</a:t>
+            </a:r>
+          </a:p>
+          <a:p>
+            <a:pPr lvl="1"/>
+            <a:r>
+              <a:rPr lang="en-US" dirty="0" smtClean="0"/>
+              <a:t>Render JSON</a:t>
+            </a:r>
+          </a:p>
+          <a:p>
+            <a:r>
+              <a:rPr lang="en-US" dirty="0" smtClean="0"/>
+              <a:t>If the number is prime,</a:t>
+            </a:r>
+          </a:p>
+          <a:p>
+            <a:pPr lvl="1"/>
+            <a:r>
+              <a:rPr lang="en-US" dirty="0" smtClean="0"/>
+              <a:t>Show it on the screen (html)</a:t>
+            </a:r>
+          </a:p>
+          <a:p>
+            <a:endParaRPr lang="en-US" dirty="0" smtClean="0"/>
+          </a:p>
+        </p:txBody>
+      </p:sp>
+      <p:sp>
+        <p:nvSpPr>
+          <p:cNvPr id="4" name="Slide Number Placeholder 3"/>
+          <p:cNvSpPr>
+            <a:spLocks noGrp="1"/>
+          </p:cNvSpPr>
+          <p:nvPr>
+            <p:ph type="sldNum" sz="quarter" idx="10"/>
+          </p:nvPr>
+        </p:nvSpPr>
+        <p:spPr/>
+        <p:txBody>
+          <a:bodyPr/>
+          <a:lstStyle/>
+          <a:p>
+            <a:pPr>
+              <a:defRPr/>
+            </a:pPr>
+            <a:fld id="{B63753EC-566D-40B0-951D-58F31B9256E5}" type="slidenum">
+              <a:rPr lang="en-US" smtClean="0"/>
+              <a:pPr>
+                <a:defRPr/>
+              </a:pPr>
+              <a:t>10</a:t>
+            </a:fld>
+            <a:endParaRPr lang="en-US"/>
+          </a:p>
+        </p:txBody>
+      </p:sp>
+    </p:spTree>
+  </p:cSld>
+  <p:clrMapOvr>
+    <a:masterClrMapping/>
+  </p:clrMapOvr>
+  <p:transition>
+    <p:fade/>
+  </p:transition>
 </p:sld>
 </file>
 
@@ -7166,7 +7332,11 @@
           <a:bodyPr/>
           <a:lstStyle/>
           <a:p>
-            <a:endParaRPr lang="en-US"/>
+            <a:r>
+              <a:rPr lang="en-US" b="1" dirty="0" smtClean="0"/>
+              <a:t>Agenda</a:t>
+            </a:r>
+            <a:endParaRPr lang="en-US" b="1" dirty="0"/>
           </a:p>
         </p:txBody>
       </p:sp>
@@ -7180,12 +7350,36 @@
             <p:ph idx="1"/>
           </p:nvPr>
         </p:nvSpPr>
-        <p:spPr/>
+        <p:spPr>
+          <a:xfrm>
+            <a:off x="381002" y="1417638"/>
+            <a:ext cx="8410575" cy="1717393"/>
+          </a:xfrm>
+        </p:spPr>
         <p:txBody>
           <a:bodyPr/>
           <a:lstStyle/>
           <a:p>
-            <a:endParaRPr lang="en-US"/>
+            <a:r>
+              <a:rPr lang="en-US" dirty="0" smtClean="0"/>
+              <a:t>Finding Actions</a:t>
+            </a:r>
+          </a:p>
+          <a:p>
+            <a:r>
+              <a:rPr lang="en-US" dirty="0" smtClean="0"/>
+              <a:t>Filters, Filters, Filters</a:t>
+            </a:r>
+          </a:p>
+          <a:p>
+            <a:r>
+              <a:rPr lang="en-US" dirty="0" err="1" smtClean="0"/>
+              <a:t>ActionResult</a:t>
+            </a:r>
+            <a:r>
+              <a:rPr lang="en-US" dirty="0" smtClean="0"/>
+              <a:t> and Data</a:t>
+            </a:r>
           </a:p>
         </p:txBody>
       </p:sp>
@@ -7261,7 +7455,11 @@
           <a:bodyPr/>
           <a:lstStyle/>
           <a:p>
-            <a:endParaRPr lang="en-US"/>
+            <a:r>
+              <a:rPr lang="en-US" b="1" dirty="0" smtClean="0"/>
+              <a:t>Finding Actions</a:t>
+            </a:r>
+            <a:endParaRPr lang="en-US" b="1" dirty="0"/>
           </a:p>
         </p:txBody>
       </p:sp>
@@ -7275,12 +7473,65 @@
             <p:ph idx="1"/>
           </p:nvPr>
         </p:nvSpPr>
-        <p:spPr/>
+        <p:spPr>
+          <a:xfrm>
+            <a:off x="381002" y="1417638"/>
+            <a:ext cx="8410575" cy="2862322"/>
+          </a:xfrm>
+        </p:spPr>
         <p:txBody>
           <a:bodyPr/>
           <a:lstStyle/>
           <a:p>
-            <a:endParaRPr lang="en-US"/>
+            <a:r>
+              <a:rPr lang="en-US" dirty="0" smtClean="0"/>
+              <a:t>Heavy lifting is done by </a:t>
+            </a:r>
+            <a:r>
+              <a:rPr lang="en-US" dirty="0" err="1" smtClean="0"/>
+              <a:t>IActionInvoker</a:t>
+            </a:r>
+            <a:endParaRPr lang="en-US" dirty="0" smtClean="0"/>
+          </a:p>
+          <a:p>
+            <a:pPr lvl="1"/>
+            <a:r>
+              <a:rPr lang="en-US" dirty="0" smtClean="0"/>
+              <a:t>Each controller provides their own </a:t>
+            </a:r>
+            <a:r>
+              <a:rPr lang="en-US" dirty="0" err="1" smtClean="0"/>
+              <a:t>IActionInvoker</a:t>
+            </a:r>
+            <a:endParaRPr lang="en-US" dirty="0" smtClean="0"/>
+          </a:p>
+          <a:p>
+            <a:pPr lvl="1"/>
+            <a:r>
+              <a:rPr lang="en-US" dirty="0" smtClean="0"/>
+              <a:t>Default is </a:t>
+            </a:r>
+            <a:r>
+              <a:rPr lang="en-US" dirty="0" err="1" smtClean="0"/>
+              <a:t>ControllerActionInvoker</a:t>
+            </a:r>
+            <a:endParaRPr lang="en-US" dirty="0"/>
+          </a:p>
+          <a:p>
+            <a:pPr lvl="1"/>
+            <a:r>
+              <a:rPr lang="en-US" dirty="0" err="1" smtClean="0"/>
+              <a:t>Async</a:t>
+            </a:r>
+            <a:r>
+              <a:rPr lang="en-US" dirty="0" smtClean="0"/>
+              <a:t> support is done via </a:t>
+            </a:r>
+            <a:r>
+              <a:rPr lang="en-US" dirty="0" err="1" smtClean="0"/>
+              <a:t>AsyncControllerActionInvoker</a:t>
+            </a:r>
+            <a:endParaRPr lang="en-US" dirty="0" smtClean="0"/>
           </a:p>
         </p:txBody>
       </p:sp>
@@ -7308,6 +7559,880 @@
                 <a:defRPr/>
               </a:pPr>
               <a:t>3</a:t>
+            </a:fld>
+            <a:endParaRPr lang="en-US"/>
+          </a:p>
+        </p:txBody>
+      </p:sp>
+    </p:spTree>
+  </p:cSld>
+  <p:clrMapOvr>
+    <a:masterClrMapping/>
+  </p:clrMapOvr>
+  <p:transition>
+    <p:fade/>
+  </p:transition>
+  <p:timing>
+    <p:tnLst>
+      <p:par>
+        <p:cTn id="1" dur="indefinite" restart="never" nodeType="tmRoot"/>
+      </p:par>
+    </p:tnLst>
+  </p:timing>
+</p:sld>
+</file>
+
+<file path=ppt/slides/slide4.xml><?xml version="1.0" encoding="utf-8"?>
+<p:sld xmlns:a="http://schemas.openxmlformats.org/drawingml/2006/main" xmlns:r="http://schemas.openxmlformats.org/officeDocument/2006/relationships" xmlns:p="http://schemas.openxmlformats.org/presentationml/2006/main">
+  <p:cSld>
+    <p:spTree>
+      <p:nvGrpSpPr>
+        <p:cNvPr id="1" name=""/>
+        <p:cNvGrpSpPr/>
+        <p:nvPr/>
+      </p:nvGrpSpPr>
+      <p:grpSpPr>
+        <a:xfrm>
+          <a:off x="0" y="0"/>
+          <a:ext cx="0" cy="0"/>
+          <a:chOff x="0" y="0"/>
+          <a:chExt cx="0" cy="0"/>
+        </a:xfrm>
+      </p:grpSpPr>
+      <p:sp>
+        <p:nvSpPr>
+          <p:cNvPr id="2" name="Title 1"/>
+          <p:cNvSpPr>
+            <a:spLocks noGrp="1"/>
+          </p:cNvSpPr>
+          <p:nvPr>
+            <p:ph type="title"/>
+          </p:nvPr>
+        </p:nvSpPr>
+        <p:spPr/>
+        <p:txBody>
+          <a:bodyPr/>
+          <a:lstStyle/>
+          <a:p>
+            <a:r>
+              <a:rPr lang="en-US" b="1" dirty="0" smtClean="0"/>
+              <a:t>Finding Actions</a:t>
+            </a:r>
+            <a:endParaRPr lang="en-US" b="1" dirty="0"/>
+          </a:p>
+        </p:txBody>
+      </p:sp>
+      <p:sp>
+        <p:nvSpPr>
+          <p:cNvPr id="3" name="Content Placeholder 2"/>
+          <p:cNvSpPr>
+            <a:spLocks noGrp="1"/>
+          </p:cNvSpPr>
+          <p:nvPr>
+            <p:ph idx="1"/>
+          </p:nvPr>
+        </p:nvSpPr>
+        <p:spPr>
+          <a:xfrm>
+            <a:off x="381002" y="1417638"/>
+            <a:ext cx="8410575" cy="2086725"/>
+          </a:xfrm>
+        </p:spPr>
+        <p:txBody>
+          <a:bodyPr/>
+          <a:lstStyle/>
+          <a:p>
+            <a:r>
+              <a:rPr lang="en-US" dirty="0" smtClean="0"/>
+              <a:t>Reflection to the rescue!</a:t>
+            </a:r>
+          </a:p>
+          <a:p>
+            <a:pPr lvl="1"/>
+            <a:r>
+              <a:rPr lang="en-US" dirty="0" smtClean="0"/>
+              <a:t>Controller types are cached</a:t>
+            </a:r>
+          </a:p>
+          <a:p>
+            <a:pPr lvl="1"/>
+            <a:r>
+              <a:rPr lang="en-US" dirty="0" smtClean="0"/>
+              <a:t>Methods found via route metadata</a:t>
+            </a:r>
+          </a:p>
+          <a:p>
+            <a:pPr lvl="1"/>
+            <a:r>
+              <a:rPr lang="en-US" dirty="0" smtClean="0"/>
+              <a:t>Filters are extracted from attributes</a:t>
+            </a:r>
+          </a:p>
+        </p:txBody>
+      </p:sp>
+      <p:sp>
+        <p:nvSpPr>
+          <p:cNvPr id="4" name="Slide Number Placeholder 3"/>
+          <p:cNvSpPr>
+            <a:spLocks noGrp="1"/>
+          </p:cNvSpPr>
+          <p:nvPr>
+            <p:ph type="sldNum" sz="quarter" idx="10"/>
+          </p:nvPr>
+        </p:nvSpPr>
+        <p:spPr/>
+        <p:txBody>
+          <a:bodyPr/>
+          <a:lstStyle/>
+          <a:p>
+            <a:pPr>
+              <a:defRPr/>
+            </a:pPr>
+            <a:fld id="{B63753EC-566D-40B0-951D-58F31B9256E5}" type="slidenum">
+              <a:rPr lang="en-US" smtClean="0"/>
+              <a:pPr>
+                <a:defRPr/>
+              </a:pPr>
+              <a:t>4</a:t>
+            </a:fld>
+            <a:endParaRPr lang="en-US"/>
+          </a:p>
+        </p:txBody>
+      </p:sp>
+    </p:spTree>
+  </p:cSld>
+  <p:clrMapOvr>
+    <a:masterClrMapping/>
+  </p:clrMapOvr>
+  <p:transition>
+    <p:fade/>
+  </p:transition>
+  <p:timing>
+    <p:tnLst>
+      <p:par>
+        <p:cTn id="1" dur="indefinite" restart="never" nodeType="tmRoot"/>
+      </p:par>
+    </p:tnLst>
+  </p:timing>
+</p:sld>
+</file>
+
+<file path=ppt/slides/slide5.xml><?xml version="1.0" encoding="utf-8"?>
+<p:sld xmlns:a="http://schemas.openxmlformats.org/drawingml/2006/main" xmlns:r="http://schemas.openxmlformats.org/officeDocument/2006/relationships" xmlns:p="http://schemas.openxmlformats.org/presentationml/2006/main">
+  <p:cSld>
+    <p:spTree>
+      <p:nvGrpSpPr>
+        <p:cNvPr id="1" name=""/>
+        <p:cNvGrpSpPr/>
+        <p:nvPr/>
+      </p:nvGrpSpPr>
+      <p:grpSpPr>
+        <a:xfrm>
+          <a:off x="0" y="0"/>
+          <a:ext cx="0" cy="0"/>
+          <a:chOff x="0" y="0"/>
+          <a:chExt cx="0" cy="0"/>
+        </a:xfrm>
+      </p:grpSpPr>
+      <p:sp>
+        <p:nvSpPr>
+          <p:cNvPr id="2" name="Title 1"/>
+          <p:cNvSpPr>
+            <a:spLocks noGrp="1"/>
+          </p:cNvSpPr>
+          <p:nvPr>
+            <p:ph type="title"/>
+          </p:nvPr>
+        </p:nvSpPr>
+        <p:spPr/>
+        <p:txBody>
+          <a:bodyPr/>
+          <a:lstStyle/>
+          <a:p>
+            <a:r>
+              <a:rPr lang="en-US" b="1" dirty="0" smtClean="0"/>
+              <a:t>Finding Actions</a:t>
+            </a:r>
+            <a:endParaRPr lang="en-US" b="1" dirty="0"/>
+          </a:p>
+        </p:txBody>
+      </p:sp>
+      <p:sp>
+        <p:nvSpPr>
+          <p:cNvPr id="3" name="Content Placeholder 2"/>
+          <p:cNvSpPr>
+            <a:spLocks noGrp="1"/>
+          </p:cNvSpPr>
+          <p:nvPr>
+            <p:ph idx="1"/>
+          </p:nvPr>
+        </p:nvSpPr>
+        <p:spPr>
+          <a:xfrm>
+            <a:off x="381002" y="1417638"/>
+            <a:ext cx="8410575" cy="2160591"/>
+          </a:xfrm>
+        </p:spPr>
+        <p:txBody>
+          <a:bodyPr/>
+          <a:lstStyle/>
+          <a:p>
+            <a:r>
+              <a:rPr lang="en-US" dirty="0" smtClean="0"/>
+              <a:t>Reflection to the rescue!</a:t>
+            </a:r>
+          </a:p>
+          <a:p>
+            <a:pPr lvl="1"/>
+            <a:r>
+              <a:rPr lang="en-US" dirty="0" err="1" smtClean="0"/>
+              <a:t>PreAction</a:t>
+            </a:r>
+            <a:r>
+              <a:rPr lang="en-US" dirty="0" smtClean="0"/>
+              <a:t> filters are executed</a:t>
+            </a:r>
+          </a:p>
+          <a:p>
+            <a:pPr lvl="1"/>
+            <a:r>
+              <a:rPr lang="en-US" dirty="0" smtClean="0"/>
+              <a:t>Action method is executed</a:t>
+            </a:r>
+          </a:p>
+          <a:p>
+            <a:pPr lvl="1"/>
+            <a:r>
+              <a:rPr lang="en-US" dirty="0" err="1" smtClean="0"/>
+              <a:t>PostAction</a:t>
+            </a:r>
+            <a:r>
+              <a:rPr lang="en-US" dirty="0" smtClean="0"/>
+              <a:t> filters are executed</a:t>
+            </a:r>
+          </a:p>
+        </p:txBody>
+      </p:sp>
+      <p:sp>
+        <p:nvSpPr>
+          <p:cNvPr id="4" name="Slide Number Placeholder 3"/>
+          <p:cNvSpPr>
+            <a:spLocks noGrp="1"/>
+          </p:cNvSpPr>
+          <p:nvPr>
+            <p:ph type="sldNum" sz="quarter" idx="10"/>
+          </p:nvPr>
+        </p:nvSpPr>
+        <p:spPr/>
+        <p:txBody>
+          <a:bodyPr/>
+          <a:lstStyle/>
+          <a:p>
+            <a:pPr>
+              <a:defRPr/>
+            </a:pPr>
+            <a:fld id="{B63753EC-566D-40B0-951D-58F31B9256E5}" type="slidenum">
+              <a:rPr lang="en-US" smtClean="0"/>
+              <a:pPr>
+                <a:defRPr/>
+              </a:pPr>
+              <a:t>5</a:t>
+            </a:fld>
+            <a:endParaRPr lang="en-US"/>
+          </a:p>
+        </p:txBody>
+      </p:sp>
+    </p:spTree>
+  </p:cSld>
+  <p:clrMapOvr>
+    <a:masterClrMapping/>
+  </p:clrMapOvr>
+  <p:transition>
+    <p:fade/>
+  </p:transition>
+  <p:timing>
+    <p:tnLst>
+      <p:par>
+        <p:cTn id="1" dur="indefinite" restart="never" nodeType="tmRoot"/>
+      </p:par>
+    </p:tnLst>
+  </p:timing>
+</p:sld>
+</file>
+
+<file path=ppt/slides/slide6.xml><?xml version="1.0" encoding="utf-8"?>
+<p:sld xmlns:a="http://schemas.openxmlformats.org/drawingml/2006/main" xmlns:r="http://schemas.openxmlformats.org/officeDocument/2006/relationships" xmlns:p="http://schemas.openxmlformats.org/presentationml/2006/main">
+  <p:cSld>
+    <p:spTree>
+      <p:nvGrpSpPr>
+        <p:cNvPr id="1" name=""/>
+        <p:cNvGrpSpPr/>
+        <p:nvPr/>
+      </p:nvGrpSpPr>
+      <p:grpSpPr>
+        <a:xfrm>
+          <a:off x="0" y="0"/>
+          <a:ext cx="0" cy="0"/>
+          <a:chOff x="0" y="0"/>
+          <a:chExt cx="0" cy="0"/>
+        </a:xfrm>
+      </p:grpSpPr>
+      <p:sp>
+        <p:nvSpPr>
+          <p:cNvPr id="2" name="Title 1"/>
+          <p:cNvSpPr>
+            <a:spLocks noGrp="1"/>
+          </p:cNvSpPr>
+          <p:nvPr>
+            <p:ph type="title"/>
+          </p:nvPr>
+        </p:nvSpPr>
+        <p:spPr/>
+        <p:txBody>
+          <a:bodyPr/>
+          <a:lstStyle/>
+          <a:p>
+            <a:r>
+              <a:rPr lang="en-US" b="1" dirty="0" smtClean="0"/>
+              <a:t>Filters, Filters, Filters</a:t>
+            </a:r>
+            <a:endParaRPr lang="en-US" b="1" dirty="0"/>
+          </a:p>
+        </p:txBody>
+      </p:sp>
+      <p:sp>
+        <p:nvSpPr>
+          <p:cNvPr id="3" name="Content Placeholder 2"/>
+          <p:cNvSpPr>
+            <a:spLocks noGrp="1"/>
+          </p:cNvSpPr>
+          <p:nvPr>
+            <p:ph idx="1"/>
+          </p:nvPr>
+        </p:nvSpPr>
+        <p:spPr>
+          <a:xfrm>
+            <a:off x="381002" y="1417638"/>
+            <a:ext cx="8410575" cy="3896451"/>
+          </a:xfrm>
+        </p:spPr>
+        <p:txBody>
+          <a:bodyPr/>
+          <a:lstStyle/>
+          <a:p>
+            <a:r>
+              <a:rPr lang="en-US" dirty="0" err="1" smtClean="0"/>
+              <a:t>IActionFilter</a:t>
+            </a:r>
+            <a:endParaRPr lang="en-US" dirty="0" smtClean="0"/>
+          </a:p>
+          <a:p>
+            <a:pPr lvl="1"/>
+            <a:r>
+              <a:rPr lang="en-US" dirty="0" smtClean="0"/>
+              <a:t>Allows for pre/post action execution manipulation</a:t>
+            </a:r>
+          </a:p>
+          <a:p>
+            <a:pPr lvl="2"/>
+            <a:r>
+              <a:rPr lang="en-US" dirty="0" smtClean="0"/>
+              <a:t>Add/remove data from the action’s context.</a:t>
+            </a:r>
+          </a:p>
+          <a:p>
+            <a:r>
+              <a:rPr lang="en-US" dirty="0" err="1" smtClean="0"/>
+              <a:t>IResultFilter</a:t>
+            </a:r>
+            <a:endParaRPr lang="en-US" dirty="0" smtClean="0"/>
+          </a:p>
+          <a:p>
+            <a:pPr lvl="1"/>
+            <a:r>
+              <a:rPr lang="en-US" dirty="0" smtClean="0"/>
+              <a:t>Allows for pre/post result execution manipulation</a:t>
+            </a:r>
+          </a:p>
+          <a:p>
+            <a:pPr lvl="2"/>
+            <a:r>
+              <a:rPr lang="en-US" dirty="0" smtClean="0"/>
+              <a:t>Inject data into the result before execution</a:t>
+            </a:r>
+          </a:p>
+        </p:txBody>
+      </p:sp>
+      <p:sp>
+        <p:nvSpPr>
+          <p:cNvPr id="4" name="Slide Number Placeholder 3"/>
+          <p:cNvSpPr>
+            <a:spLocks noGrp="1"/>
+          </p:cNvSpPr>
+          <p:nvPr>
+            <p:ph type="sldNum" sz="quarter" idx="10"/>
+          </p:nvPr>
+        </p:nvSpPr>
+        <p:spPr/>
+        <p:txBody>
+          <a:bodyPr/>
+          <a:lstStyle/>
+          <a:p>
+            <a:pPr>
+              <a:defRPr/>
+            </a:pPr>
+            <a:fld id="{B63753EC-566D-40B0-951D-58F31B9256E5}" type="slidenum">
+              <a:rPr lang="en-US" smtClean="0"/>
+              <a:pPr>
+                <a:defRPr/>
+              </a:pPr>
+              <a:t>6</a:t>
+            </a:fld>
+            <a:endParaRPr lang="en-US"/>
+          </a:p>
+        </p:txBody>
+      </p:sp>
+    </p:spTree>
+  </p:cSld>
+  <p:clrMapOvr>
+    <a:masterClrMapping/>
+  </p:clrMapOvr>
+  <p:transition>
+    <p:fade/>
+  </p:transition>
+</p:sld>
+</file>
+
+<file path=ppt/slides/slide7.xml><?xml version="1.0" encoding="utf-8"?>
+<p:sld xmlns:a="http://schemas.openxmlformats.org/drawingml/2006/main" xmlns:r="http://schemas.openxmlformats.org/officeDocument/2006/relationships" xmlns:p="http://schemas.openxmlformats.org/presentationml/2006/main">
+  <p:cSld>
+    <p:spTree>
+      <p:nvGrpSpPr>
+        <p:cNvPr id="1" name=""/>
+        <p:cNvGrpSpPr/>
+        <p:nvPr/>
+      </p:nvGrpSpPr>
+      <p:grpSpPr>
+        <a:xfrm>
+          <a:off x="0" y="0"/>
+          <a:ext cx="0" cy="0"/>
+          <a:chOff x="0" y="0"/>
+          <a:chExt cx="0" cy="0"/>
+        </a:xfrm>
+      </p:grpSpPr>
+      <p:sp>
+        <p:nvSpPr>
+          <p:cNvPr id="2" name="Title 1"/>
+          <p:cNvSpPr>
+            <a:spLocks noGrp="1"/>
+          </p:cNvSpPr>
+          <p:nvPr>
+            <p:ph type="title"/>
+          </p:nvPr>
+        </p:nvSpPr>
+        <p:spPr/>
+        <p:txBody>
+          <a:bodyPr/>
+          <a:lstStyle/>
+          <a:p>
+            <a:r>
+              <a:rPr lang="en-US" b="1" dirty="0" smtClean="0"/>
+              <a:t>Filters, Filters, Filters</a:t>
+            </a:r>
+            <a:endParaRPr lang="en-US" b="1" dirty="0"/>
+          </a:p>
+        </p:txBody>
+      </p:sp>
+      <p:sp>
+        <p:nvSpPr>
+          <p:cNvPr id="3" name="Content Placeholder 2"/>
+          <p:cNvSpPr>
+            <a:spLocks noGrp="1"/>
+          </p:cNvSpPr>
+          <p:nvPr>
+            <p:ph idx="1"/>
+          </p:nvPr>
+        </p:nvSpPr>
+        <p:spPr>
+          <a:xfrm>
+            <a:off x="381002" y="1417638"/>
+            <a:ext cx="8410575" cy="3508653"/>
+          </a:xfrm>
+        </p:spPr>
+        <p:txBody>
+          <a:bodyPr/>
+          <a:lstStyle/>
+          <a:p>
+            <a:r>
+              <a:rPr lang="en-US" dirty="0" err="1" smtClean="0"/>
+              <a:t>IExceptionFilter</a:t>
+            </a:r>
+            <a:endParaRPr lang="en-US" dirty="0" smtClean="0"/>
+          </a:p>
+          <a:p>
+            <a:pPr lvl="1"/>
+            <a:r>
+              <a:rPr lang="en-US" dirty="0" smtClean="0"/>
+              <a:t>Allows for inspection when an exception occurs.</a:t>
+            </a:r>
+          </a:p>
+          <a:p>
+            <a:pPr lvl="2"/>
+            <a:r>
+              <a:rPr lang="en-US" dirty="0" smtClean="0"/>
+              <a:t>Logging of exceptions</a:t>
+            </a:r>
+          </a:p>
+          <a:p>
+            <a:r>
+              <a:rPr lang="en-US" dirty="0" err="1" smtClean="0"/>
+              <a:t>IAuthorizationFilter</a:t>
+            </a:r>
+            <a:endParaRPr lang="en-US" dirty="0" smtClean="0"/>
+          </a:p>
+          <a:p>
+            <a:pPr lvl="1"/>
+            <a:r>
+              <a:rPr lang="en-US" dirty="0" smtClean="0"/>
+              <a:t>Allows access check for a specific action/controller</a:t>
+            </a:r>
+          </a:p>
+          <a:p>
+            <a:pPr lvl="2"/>
+            <a:r>
+              <a:rPr lang="en-US" dirty="0" smtClean="0"/>
+              <a:t>Allow only “administrators” to execute method</a:t>
+            </a:r>
+          </a:p>
+        </p:txBody>
+      </p:sp>
+      <p:sp>
+        <p:nvSpPr>
+          <p:cNvPr id="4" name="Slide Number Placeholder 3"/>
+          <p:cNvSpPr>
+            <a:spLocks noGrp="1"/>
+          </p:cNvSpPr>
+          <p:nvPr>
+            <p:ph type="sldNum" sz="quarter" idx="10"/>
+          </p:nvPr>
+        </p:nvSpPr>
+        <p:spPr/>
+        <p:txBody>
+          <a:bodyPr/>
+          <a:lstStyle/>
+          <a:p>
+            <a:pPr>
+              <a:defRPr/>
+            </a:pPr>
+            <a:fld id="{B63753EC-566D-40B0-951D-58F31B9256E5}" type="slidenum">
+              <a:rPr lang="en-US" smtClean="0"/>
+              <a:pPr>
+                <a:defRPr/>
+              </a:pPr>
+              <a:t>7</a:t>
+            </a:fld>
+            <a:endParaRPr lang="en-US"/>
+          </a:p>
+        </p:txBody>
+      </p:sp>
+    </p:spTree>
+  </p:cSld>
+  <p:clrMapOvr>
+    <a:masterClrMapping/>
+  </p:clrMapOvr>
+  <p:transition>
+    <p:fade/>
+  </p:transition>
+</p:sld>
+</file>
+
+<file path=ppt/slides/slide8.xml><?xml version="1.0" encoding="utf-8"?>
+<p:sld xmlns:a="http://schemas.openxmlformats.org/drawingml/2006/main" xmlns:r="http://schemas.openxmlformats.org/officeDocument/2006/relationships" xmlns:p="http://schemas.openxmlformats.org/presentationml/2006/main">
+  <p:cSld>
+    <p:spTree>
+      <p:nvGrpSpPr>
+        <p:cNvPr id="1" name=""/>
+        <p:cNvGrpSpPr/>
+        <p:nvPr/>
+      </p:nvGrpSpPr>
+      <p:grpSpPr>
+        <a:xfrm>
+          <a:off x="0" y="0"/>
+          <a:ext cx="0" cy="0"/>
+          <a:chOff x="0" y="0"/>
+          <a:chExt cx="0" cy="0"/>
+        </a:xfrm>
+      </p:grpSpPr>
+      <p:sp>
+        <p:nvSpPr>
+          <p:cNvPr id="2" name="Title 1"/>
+          <p:cNvSpPr>
+            <a:spLocks noGrp="1"/>
+          </p:cNvSpPr>
+          <p:nvPr>
+            <p:ph type="title"/>
+          </p:nvPr>
+        </p:nvSpPr>
+        <p:spPr/>
+        <p:txBody>
+          <a:bodyPr/>
+          <a:lstStyle/>
+          <a:p>
+            <a:r>
+              <a:rPr lang="en-US" b="1" dirty="0" err="1" smtClean="0"/>
+              <a:t>ActionResult</a:t>
+            </a:r>
+            <a:r>
+              <a:rPr lang="en-US" b="1" dirty="0" smtClean="0"/>
+              <a:t> and Data</a:t>
+            </a:r>
+            <a:endParaRPr lang="en-US" b="1" dirty="0"/>
+          </a:p>
+        </p:txBody>
+      </p:sp>
+      <p:sp>
+        <p:nvSpPr>
+          <p:cNvPr id="3" name="Content Placeholder 2"/>
+          <p:cNvSpPr>
+            <a:spLocks noGrp="1"/>
+          </p:cNvSpPr>
+          <p:nvPr>
+            <p:ph idx="1"/>
+          </p:nvPr>
+        </p:nvSpPr>
+        <p:spPr>
+          <a:xfrm>
+            <a:off x="381002" y="1417638"/>
+            <a:ext cx="8410575" cy="3194721"/>
+          </a:xfrm>
+        </p:spPr>
+        <p:txBody>
+          <a:bodyPr/>
+          <a:lstStyle/>
+          <a:p>
+            <a:r>
+              <a:rPr lang="en-US" dirty="0" smtClean="0"/>
+              <a:t>HTTP Interaction</a:t>
+            </a:r>
+          </a:p>
+          <a:p>
+            <a:pPr lvl="1"/>
+            <a:r>
+              <a:rPr lang="en-US" dirty="0" smtClean="0"/>
+              <a:t>Handle the inner details of the response</a:t>
+            </a:r>
+          </a:p>
+          <a:p>
+            <a:r>
+              <a:rPr lang="en-US" dirty="0" smtClean="0"/>
+              <a:t>Can be extremely simple</a:t>
+            </a:r>
+          </a:p>
+          <a:p>
+            <a:pPr lvl="1"/>
+            <a:r>
+              <a:rPr lang="en-US" dirty="0" smtClean="0"/>
+              <a:t>200 – OK</a:t>
+            </a:r>
+          </a:p>
+          <a:p>
+            <a:pPr lvl="1"/>
+            <a:r>
+              <a:rPr lang="en-US" dirty="0" smtClean="0"/>
+              <a:t>302 - Redirect</a:t>
+            </a:r>
+            <a:endParaRPr lang="en-US" dirty="0" smtClean="0"/>
+          </a:p>
+          <a:p>
+            <a:pPr lvl="1"/>
+            <a:endParaRPr lang="en-US" dirty="0" smtClean="0"/>
+          </a:p>
+        </p:txBody>
+      </p:sp>
+      <p:sp>
+        <p:nvSpPr>
+          <p:cNvPr id="4" name="Slide Number Placeholder 3"/>
+          <p:cNvSpPr>
+            <a:spLocks noGrp="1"/>
+          </p:cNvSpPr>
+          <p:nvPr>
+            <p:ph type="sldNum" sz="quarter" idx="10"/>
+          </p:nvPr>
+        </p:nvSpPr>
+        <p:spPr/>
+        <p:txBody>
+          <a:bodyPr/>
+          <a:lstStyle/>
+          <a:p>
+            <a:pPr>
+              <a:defRPr/>
+            </a:pPr>
+            <a:fld id="{B63753EC-566D-40B0-951D-58F31B9256E5}" type="slidenum">
+              <a:rPr lang="en-US" smtClean="0"/>
+              <a:pPr>
+                <a:defRPr/>
+              </a:pPr>
+              <a:t>8</a:t>
+            </a:fld>
+            <a:endParaRPr lang="en-US"/>
+          </a:p>
+        </p:txBody>
+      </p:sp>
+    </p:spTree>
+  </p:cSld>
+  <p:clrMapOvr>
+    <a:masterClrMapping/>
+  </p:clrMapOvr>
+  <p:transition>
+    <p:fade/>
+  </p:transition>
+</p:sld>
+</file>
+
+<file path=ppt/slides/slide9.xml><?xml version="1.0" encoding="utf-8"?>
+<p:sld xmlns:a="http://schemas.openxmlformats.org/drawingml/2006/main" xmlns:r="http://schemas.openxmlformats.org/officeDocument/2006/relationships" xmlns:p="http://schemas.openxmlformats.org/presentationml/2006/main">
+  <p:cSld>
+    <p:spTree>
+      <p:nvGrpSpPr>
+        <p:cNvPr id="1" name=""/>
+        <p:cNvGrpSpPr/>
+        <p:nvPr/>
+      </p:nvGrpSpPr>
+      <p:grpSpPr>
+        <a:xfrm>
+          <a:off x="0" y="0"/>
+          <a:ext cx="0" cy="0"/>
+          <a:chOff x="0" y="0"/>
+          <a:chExt cx="0" cy="0"/>
+        </a:xfrm>
+      </p:grpSpPr>
+      <p:sp>
+        <p:nvSpPr>
+          <p:cNvPr id="2" name="Title 1"/>
+          <p:cNvSpPr>
+            <a:spLocks noGrp="1"/>
+          </p:cNvSpPr>
+          <p:nvPr>
+            <p:ph type="title"/>
+          </p:nvPr>
+        </p:nvSpPr>
+        <p:spPr/>
+        <p:txBody>
+          <a:bodyPr/>
+          <a:lstStyle/>
+          <a:p>
+            <a:r>
+              <a:rPr lang="en-US" b="1" dirty="0" err="1" smtClean="0"/>
+              <a:t>ActionResult</a:t>
+            </a:r>
+            <a:r>
+              <a:rPr lang="en-US" b="1" dirty="0" smtClean="0"/>
+              <a:t> and Data</a:t>
+            </a:r>
+            <a:endParaRPr lang="en-US" b="1" dirty="0"/>
+          </a:p>
+        </p:txBody>
+      </p:sp>
+      <p:sp>
+        <p:nvSpPr>
+          <p:cNvPr id="3" name="Content Placeholder 2"/>
+          <p:cNvSpPr>
+            <a:spLocks noGrp="1"/>
+          </p:cNvSpPr>
+          <p:nvPr>
+            <p:ph idx="1"/>
+          </p:nvPr>
+        </p:nvSpPr>
+        <p:spPr>
+          <a:xfrm>
+            <a:off x="381002" y="1417638"/>
+            <a:ext cx="8410575" cy="4376583"/>
+          </a:xfrm>
+        </p:spPr>
+        <p:txBody>
+          <a:bodyPr/>
+          <a:lstStyle/>
+          <a:p>
+            <a:r>
+              <a:rPr lang="en-US" dirty="0" smtClean="0"/>
+              <a:t>Execution context</a:t>
+            </a:r>
+          </a:p>
+          <a:p>
+            <a:pPr lvl="1"/>
+            <a:r>
+              <a:rPr lang="en-US" dirty="0" smtClean="0"/>
+              <a:t>Interaction with </a:t>
+            </a:r>
+            <a:r>
+              <a:rPr lang="en-US" dirty="0" err="1" smtClean="0"/>
+              <a:t>IResultFIlter</a:t>
+            </a:r>
+            <a:endParaRPr lang="en-US" dirty="0" smtClean="0"/>
+          </a:p>
+          <a:p>
+            <a:r>
+              <a:rPr lang="en-US" dirty="0" smtClean="0"/>
+              <a:t>Reusable units of work</a:t>
+            </a:r>
+          </a:p>
+          <a:p>
+            <a:pPr lvl="1"/>
+            <a:r>
+              <a:rPr lang="en-US" dirty="0" smtClean="0"/>
+              <a:t>JSON</a:t>
+            </a:r>
+          </a:p>
+          <a:p>
+            <a:pPr lvl="1"/>
+            <a:r>
+              <a:rPr lang="en-US" dirty="0" smtClean="0"/>
+              <a:t>HTML</a:t>
+            </a:r>
+          </a:p>
+          <a:p>
+            <a:pPr lvl="1"/>
+            <a:r>
+              <a:rPr lang="en-US" dirty="0" smtClean="0"/>
+              <a:t>PDF</a:t>
+            </a:r>
+          </a:p>
+          <a:p>
+            <a:pPr lvl="1"/>
+            <a:r>
+              <a:rPr lang="en-US" dirty="0" smtClean="0"/>
+              <a:t>TXT</a:t>
+            </a:r>
+          </a:p>
+          <a:p>
+            <a:endParaRPr lang="en-US" dirty="0"/>
+          </a:p>
+        </p:txBody>
+      </p:sp>
+      <p:sp>
+        <p:nvSpPr>
+          <p:cNvPr id="4" name="Slide Number Placeholder 3"/>
+          <p:cNvSpPr>
+            <a:spLocks noGrp="1"/>
+          </p:cNvSpPr>
+          <p:nvPr>
+            <p:ph type="sldNum" sz="quarter" idx="10"/>
+          </p:nvPr>
+        </p:nvSpPr>
+        <p:spPr/>
+        <p:txBody>
+          <a:bodyPr/>
+          <a:lstStyle/>
+          <a:p>
+            <a:pPr>
+              <a:defRPr/>
+            </a:pPr>
+            <a:fld id="{B63753EC-566D-40B0-951D-58F31B9256E5}" type="slidenum">
+              <a:rPr lang="en-US" smtClean="0"/>
+              <a:pPr>
+                <a:defRPr/>
+              </a:pPr>
+              <a:t>9</a:t>
             </a:fld>
             <a:endParaRPr lang="en-US"/>
           </a:p>

</xml_diff>

<commit_message>
Committed the QuickLab working sample
</commit_message>
<xml_diff>
--- a/slides/part1_actions.pptx
+++ b/slides/part1_actions.pptx
@@ -251,7 +251,7 @@
               <a:pPr>
                 <a:defRPr/>
               </a:pPr>
-              <a:t>8/26/2010 12:51 PM</a:t>
+              <a:t>8/28/2010 11:36 PM</a:t>
             </a:fld>
             <a:endParaRPr lang="en-US"/>
           </a:p>
@@ -461,7 +461,7 @@
               <a:pPr>
                 <a:defRPr/>
               </a:pPr>
-              <a:t>8/26/2010 12:51 PM</a:t>
+              <a:t>8/28/2010 11:36 PM</a:t>
             </a:fld>
             <a:endParaRPr lang="en-US"/>
           </a:p>
@@ -861,7 +861,7 @@
             <a:fld id="{645EDAD1-88E4-4536-AD95-0BFD82EC77E6}" type="datetime8">
               <a:rPr lang="en-US" smtClean="0"/>
               <a:pPr/>
-              <a:t>8/26/2010 12:51 PM</a:t>
+              <a:t>8/28/2010 11:36 PM</a:t>
             </a:fld>
             <a:endParaRPr lang="en-US" smtClean="0"/>
           </a:p>
@@ -7190,7 +7190,7 @@
         <p:spPr>
           <a:xfrm>
             <a:off x="381002" y="1417638"/>
-            <a:ext cx="8410575" cy="4830762"/>
+            <a:ext cx="8410575" cy="3711785"/>
           </a:xfrm>
         </p:spPr>
         <p:txBody>
@@ -7238,24 +7238,13 @@
           <a:p>
             <a:pPr lvl="1"/>
             <a:r>
-              <a:rPr lang="en-US" dirty="0" smtClean="0"/>
-              <a:t>Render JSON</a:t>
-            </a:r>
-          </a:p>
-          <a:p>
-            <a:r>
-              <a:rPr lang="en-US" dirty="0" smtClean="0"/>
-              <a:t>If the number is prime,</a:t>
-            </a:r>
-          </a:p>
-          <a:p>
-            <a:pPr lvl="1"/>
-            <a:r>
-              <a:rPr lang="en-US" dirty="0" smtClean="0"/>
-              <a:t>Show it on the screen (html)</a:t>
-            </a:r>
-          </a:p>
-          <a:p>
+              <a:rPr lang="en-US" smtClean="0"/>
+              <a:t>Render </a:t>
+            </a:r>
+            <a:r>
+              <a:rPr lang="en-US" smtClean="0"/>
+              <a:t>JSON</a:t>
+            </a:r>
             <a:endParaRPr lang="en-US" dirty="0" smtClean="0"/>
           </a:p>
         </p:txBody>
@@ -8241,7 +8230,6 @@
               <a:rPr lang="en-US" dirty="0" smtClean="0"/>
               <a:t>302 - Redirect</a:t>
             </a:r>
-            <a:endParaRPr lang="en-US" dirty="0" smtClean="0"/>
           </a:p>
           <a:p>
             <a:pPr lvl="1"/>

</xml_diff>